<commit_message>
Updates in install, Cleanup Files and Tutorials
</commit_message>
<xml_diff>
--- a/scratchClientTutorial/NL---Nederlands/NL - 2 - scratchCl Gevorderden Les.pptx
+++ b/scratchClientTutorial/NL---Nederlands/NL - 2 - scratchCl Gevorderden Les.pptx
@@ -221,7 +221,7 @@
             <a:fld id="{DB6A203D-5BB1-439B-9A8B-0C4974EC0C08}" type="datetimeFigureOut">
               <a:rPr lang="nl-NL" smtClean="0"/>
               <a:pPr/>
-              <a:t>2-9-2018</a:t>
+              <a:t>2-11-2018</a:t>
             </a:fld>
             <a:endParaRPr lang="nl-NL"/>
           </a:p>
@@ -5122,15 +5122,7 @@
                   <a:schemeClr val="bg1"/>
                 </a:solidFill>
               </a:rPr>
-              <a:t>Workshop voor de Pi And More </a:t>
-            </a:r>
-            <a:r>
-              <a:rPr lang="nl-NL" dirty="0" smtClean="0">
-                <a:solidFill>
-                  <a:schemeClr val="bg1"/>
-                </a:solidFill>
-              </a:rPr>
-              <a:t>en Maker Fair conferenties</a:t>
+              <a:t>Workshop voor de Pi And More en Maker Fair conferenties</a:t>
             </a:r>
             <a:endParaRPr lang="nl-NL" dirty="0">
               <a:solidFill>
@@ -5361,7 +5353,7 @@
           <p:cNvPr id="6" name="Tekstvak 5">
             <a:extLst>
               <a:ext uri="{FF2B5EF4-FFF2-40B4-BE49-F238E27FC236}">
-                <a16:creationId xmlns:a16="http://schemas.microsoft.com/office/drawing/2014/main" xmlns="" id="{6073C9BE-C429-4631-814F-5D377B0CD5A9}"/>
+                <a16:creationId xmlns="" xmlns:a16="http://schemas.microsoft.com/office/drawing/2014/main" id="{6073C9BE-C429-4631-814F-5D377B0CD5A9}"/>
               </a:ext>
             </a:extLst>
           </p:cNvPr>
@@ -5403,7 +5395,7 @@
           <p:cNvPr id="7" name="Tekstvak 6">
             <a:extLst>
               <a:ext uri="{FF2B5EF4-FFF2-40B4-BE49-F238E27FC236}">
-                <a16:creationId xmlns:a16="http://schemas.microsoft.com/office/drawing/2014/main" xmlns="" id="{6073C9BE-C429-4631-814F-5D377B0CD5A9}"/>
+                <a16:creationId xmlns="" xmlns:a16="http://schemas.microsoft.com/office/drawing/2014/main" id="{6073C9BE-C429-4631-814F-5D377B0CD5A9}"/>
               </a:ext>
             </a:extLst>
           </p:cNvPr>
@@ -5445,7 +5437,7 @@
           <p:cNvPr id="8" name="Tekstvak 7">
             <a:extLst>
               <a:ext uri="{FF2B5EF4-FFF2-40B4-BE49-F238E27FC236}">
-                <a16:creationId xmlns:a16="http://schemas.microsoft.com/office/drawing/2014/main" xmlns="" id="{6073C9BE-C429-4631-814F-5D377B0CD5A9}"/>
+                <a16:creationId xmlns="" xmlns:a16="http://schemas.microsoft.com/office/drawing/2014/main" id="{6073C9BE-C429-4631-814F-5D377B0CD5A9}"/>
               </a:ext>
             </a:extLst>
           </p:cNvPr>
@@ -5487,7 +5479,7 @@
           <p:cNvPr id="9" name="Tekstvak 8">
             <a:extLst>
               <a:ext uri="{FF2B5EF4-FFF2-40B4-BE49-F238E27FC236}">
-                <a16:creationId xmlns:a16="http://schemas.microsoft.com/office/drawing/2014/main" xmlns="" id="{6073C9BE-C429-4631-814F-5D377B0CD5A9}"/>
+                <a16:creationId xmlns="" xmlns:a16="http://schemas.microsoft.com/office/drawing/2014/main" id="{6073C9BE-C429-4631-814F-5D377B0CD5A9}"/>
               </a:ext>
             </a:extLst>
           </p:cNvPr>
@@ -5529,7 +5521,7 @@
           <p:cNvPr id="10" name="Tekstvak 9">
             <a:extLst>
               <a:ext uri="{FF2B5EF4-FFF2-40B4-BE49-F238E27FC236}">
-                <a16:creationId xmlns:a16="http://schemas.microsoft.com/office/drawing/2014/main" xmlns="" id="{6073C9BE-C429-4631-814F-5D377B0CD5A9}"/>
+                <a16:creationId xmlns="" xmlns:a16="http://schemas.microsoft.com/office/drawing/2014/main" id="{6073C9BE-C429-4631-814F-5D377B0CD5A9}"/>
               </a:ext>
             </a:extLst>
           </p:cNvPr>
@@ -6425,7 +6417,7 @@
           <p:cNvPr id="17" name="Tekstvak 24">
             <a:extLst>
               <a:ext uri="{FF2B5EF4-FFF2-40B4-BE49-F238E27FC236}">
-                <a16:creationId xmlns:a16="http://schemas.microsoft.com/office/drawing/2014/main" xmlns="" id="{6073C9BE-C429-4631-814F-5D377B0CD5A9}"/>
+                <a16:creationId xmlns="" xmlns:a16="http://schemas.microsoft.com/office/drawing/2014/main" id="{6073C9BE-C429-4631-814F-5D377B0CD5A9}"/>
               </a:ext>
             </a:extLst>
           </p:cNvPr>
@@ -6467,7 +6459,7 @@
           <p:cNvPr id="19" name="Tekstvak 24">
             <a:extLst>
               <a:ext uri="{FF2B5EF4-FFF2-40B4-BE49-F238E27FC236}">
-                <a16:creationId xmlns:a16="http://schemas.microsoft.com/office/drawing/2014/main" xmlns="" id="{5D5016BD-E991-4EFB-BBBA-396AA1A008B1}"/>
+                <a16:creationId xmlns="" xmlns:a16="http://schemas.microsoft.com/office/drawing/2014/main" id="{5D5016BD-E991-4EFB-BBBA-396AA1A008B1}"/>
               </a:ext>
             </a:extLst>
           </p:cNvPr>
@@ -6509,7 +6501,7 @@
           <p:cNvPr id="20" name="Tekstvak 24">
             <a:extLst>
               <a:ext uri="{FF2B5EF4-FFF2-40B4-BE49-F238E27FC236}">
-                <a16:creationId xmlns:a16="http://schemas.microsoft.com/office/drawing/2014/main" xmlns="" id="{6073C9BE-C429-4631-814F-5D377B0CD5A9}"/>
+                <a16:creationId xmlns="" xmlns:a16="http://schemas.microsoft.com/office/drawing/2014/main" id="{6073C9BE-C429-4631-814F-5D377B0CD5A9}"/>
               </a:ext>
             </a:extLst>
           </p:cNvPr>
@@ -6551,7 +6543,7 @@
           <p:cNvPr id="21" name="Tekstvak 24">
             <a:extLst>
               <a:ext uri="{FF2B5EF4-FFF2-40B4-BE49-F238E27FC236}">
-                <a16:creationId xmlns:a16="http://schemas.microsoft.com/office/drawing/2014/main" xmlns="" id="{6073C9BE-C429-4631-814F-5D377B0CD5A9}"/>
+                <a16:creationId xmlns="" xmlns:a16="http://schemas.microsoft.com/office/drawing/2014/main" id="{6073C9BE-C429-4631-814F-5D377B0CD5A9}"/>
               </a:ext>
             </a:extLst>
           </p:cNvPr>
@@ -6593,7 +6585,7 @@
           <p:cNvPr id="22" name="Tekstvak 24">
             <a:extLst>
               <a:ext uri="{FF2B5EF4-FFF2-40B4-BE49-F238E27FC236}">
-                <a16:creationId xmlns:a16="http://schemas.microsoft.com/office/drawing/2014/main" xmlns="" id="{6073C9BE-C429-4631-814F-5D377B0CD5A9}"/>
+                <a16:creationId xmlns="" xmlns:a16="http://schemas.microsoft.com/office/drawing/2014/main" id="{6073C9BE-C429-4631-814F-5D377B0CD5A9}"/>
               </a:ext>
             </a:extLst>
           </p:cNvPr>
@@ -6635,7 +6627,7 @@
           <p:cNvPr id="23" name="Tekstvak 24">
             <a:extLst>
               <a:ext uri="{FF2B5EF4-FFF2-40B4-BE49-F238E27FC236}">
-                <a16:creationId xmlns:a16="http://schemas.microsoft.com/office/drawing/2014/main" xmlns="" id="{5D5016BD-E991-4EFB-BBBA-396AA1A008B1}"/>
+                <a16:creationId xmlns="" xmlns:a16="http://schemas.microsoft.com/office/drawing/2014/main" id="{5D5016BD-E991-4EFB-BBBA-396AA1A008B1}"/>
               </a:ext>
             </a:extLst>
           </p:cNvPr>
@@ -6677,7 +6669,7 @@
           <p:cNvPr id="24" name="Tekstvak 24">
             <a:extLst>
               <a:ext uri="{FF2B5EF4-FFF2-40B4-BE49-F238E27FC236}">
-                <a16:creationId xmlns:a16="http://schemas.microsoft.com/office/drawing/2014/main" xmlns="" id="{6073C9BE-C429-4631-814F-5D377B0CD5A9}"/>
+                <a16:creationId xmlns="" xmlns:a16="http://schemas.microsoft.com/office/drawing/2014/main" id="{6073C9BE-C429-4631-814F-5D377B0CD5A9}"/>
               </a:ext>
             </a:extLst>
           </p:cNvPr>
@@ -6719,7 +6711,7 @@
           <p:cNvPr id="25" name="Tekstvak 24">
             <a:extLst>
               <a:ext uri="{FF2B5EF4-FFF2-40B4-BE49-F238E27FC236}">
-                <a16:creationId xmlns:a16="http://schemas.microsoft.com/office/drawing/2014/main" xmlns="" id="{6073C9BE-C429-4631-814F-5D377B0CD5A9}"/>
+                <a16:creationId xmlns="" xmlns:a16="http://schemas.microsoft.com/office/drawing/2014/main" id="{6073C9BE-C429-4631-814F-5D377B0CD5A9}"/>
               </a:ext>
             </a:extLst>
           </p:cNvPr>
@@ -8285,7 +8277,7 @@
           <p:cNvPr id="22" name="Tekstvak 24">
             <a:extLst>
               <a:ext uri="{FF2B5EF4-FFF2-40B4-BE49-F238E27FC236}">
-                <a16:creationId xmlns:a16="http://schemas.microsoft.com/office/drawing/2014/main" xmlns="" id="{6073C9BE-C429-4631-814F-5D377B0CD5A9}"/>
+                <a16:creationId xmlns="" xmlns:a16="http://schemas.microsoft.com/office/drawing/2014/main" id="{6073C9BE-C429-4631-814F-5D377B0CD5A9}"/>
               </a:ext>
             </a:extLst>
           </p:cNvPr>
@@ -8327,7 +8319,7 @@
           <p:cNvPr id="23" name="Tekstvak 24">
             <a:extLst>
               <a:ext uri="{FF2B5EF4-FFF2-40B4-BE49-F238E27FC236}">
-                <a16:creationId xmlns:a16="http://schemas.microsoft.com/office/drawing/2014/main" xmlns="" id="{5D5016BD-E991-4EFB-BBBA-396AA1A008B1}"/>
+                <a16:creationId xmlns="" xmlns:a16="http://schemas.microsoft.com/office/drawing/2014/main" id="{5D5016BD-E991-4EFB-BBBA-396AA1A008B1}"/>
               </a:ext>
             </a:extLst>
           </p:cNvPr>
@@ -8369,7 +8361,7 @@
           <p:cNvPr id="24" name="Tekstvak 24">
             <a:extLst>
               <a:ext uri="{FF2B5EF4-FFF2-40B4-BE49-F238E27FC236}">
-                <a16:creationId xmlns:a16="http://schemas.microsoft.com/office/drawing/2014/main" xmlns="" id="{6073C9BE-C429-4631-814F-5D377B0CD5A9}"/>
+                <a16:creationId xmlns="" xmlns:a16="http://schemas.microsoft.com/office/drawing/2014/main" id="{6073C9BE-C429-4631-814F-5D377B0CD5A9}"/>
               </a:ext>
             </a:extLst>
           </p:cNvPr>
@@ -8411,7 +8403,7 @@
           <p:cNvPr id="25" name="Tekstvak 24">
             <a:extLst>
               <a:ext uri="{FF2B5EF4-FFF2-40B4-BE49-F238E27FC236}">
-                <a16:creationId xmlns:a16="http://schemas.microsoft.com/office/drawing/2014/main" xmlns="" id="{6073C9BE-C429-4631-814F-5D377B0CD5A9}"/>
+                <a16:creationId xmlns="" xmlns:a16="http://schemas.microsoft.com/office/drawing/2014/main" id="{6073C9BE-C429-4631-814F-5D377B0CD5A9}"/>
               </a:ext>
             </a:extLst>
           </p:cNvPr>
@@ -8453,7 +8445,7 @@
           <p:cNvPr id="26" name="Tekstvak 24">
             <a:extLst>
               <a:ext uri="{FF2B5EF4-FFF2-40B4-BE49-F238E27FC236}">
-                <a16:creationId xmlns:a16="http://schemas.microsoft.com/office/drawing/2014/main" xmlns="" id="{6073C9BE-C429-4631-814F-5D377B0CD5A9}"/>
+                <a16:creationId xmlns="" xmlns:a16="http://schemas.microsoft.com/office/drawing/2014/main" id="{6073C9BE-C429-4631-814F-5D377B0CD5A9}"/>
               </a:ext>
             </a:extLst>
           </p:cNvPr>
@@ -8495,7 +8487,7 @@
           <p:cNvPr id="27" name="Tekstvak 24">
             <a:extLst>
               <a:ext uri="{FF2B5EF4-FFF2-40B4-BE49-F238E27FC236}">
-                <a16:creationId xmlns:a16="http://schemas.microsoft.com/office/drawing/2014/main" xmlns="" id="{5D5016BD-E991-4EFB-BBBA-396AA1A008B1}"/>
+                <a16:creationId xmlns="" xmlns:a16="http://schemas.microsoft.com/office/drawing/2014/main" id="{5D5016BD-E991-4EFB-BBBA-396AA1A008B1}"/>
               </a:ext>
             </a:extLst>
           </p:cNvPr>
@@ -8537,7 +8529,7 @@
           <p:cNvPr id="28" name="Tekstvak 24">
             <a:extLst>
               <a:ext uri="{FF2B5EF4-FFF2-40B4-BE49-F238E27FC236}">
-                <a16:creationId xmlns:a16="http://schemas.microsoft.com/office/drawing/2014/main" xmlns="" id="{6073C9BE-C429-4631-814F-5D377B0CD5A9}"/>
+                <a16:creationId xmlns="" xmlns:a16="http://schemas.microsoft.com/office/drawing/2014/main" id="{6073C9BE-C429-4631-814F-5D377B0CD5A9}"/>
               </a:ext>
             </a:extLst>
           </p:cNvPr>
@@ -8579,7 +8571,7 @@
           <p:cNvPr id="29" name="Tekstvak 28">
             <a:extLst>
               <a:ext uri="{FF2B5EF4-FFF2-40B4-BE49-F238E27FC236}">
-                <a16:creationId xmlns:a16="http://schemas.microsoft.com/office/drawing/2014/main" xmlns="" id="{6073C9BE-C429-4631-814F-5D377B0CD5A9}"/>
+                <a16:creationId xmlns="" xmlns:a16="http://schemas.microsoft.com/office/drawing/2014/main" id="{6073C9BE-C429-4631-814F-5D377B0CD5A9}"/>
               </a:ext>
             </a:extLst>
           </p:cNvPr>
@@ -8773,15 +8765,7 @@
             <a:pPr lvl="1"/>
             <a:r>
               <a:rPr lang="nl-NL" dirty="0" smtClean="0"/>
-              <a:t>Omdat de </a:t>
-            </a:r>
-            <a:r>
-              <a:rPr lang="nl-NL" dirty="0" smtClean="0"/>
-              <a:t>waarde </a:t>
-            </a:r>
-            <a:r>
-              <a:rPr lang="nl-NL" dirty="0" smtClean="0"/>
-              <a:t>van de potmeter een beetje varieert en er wat variaties in de voedingspanning zijn, is de waarde van de potmeter niet constant.</a:t>
+              <a:t>Omdat de waarde van de potmeter een beetje varieert en er wat variaties in de voedingspanning zijn, is de waarde van de potmeter niet constant.</a:t>
             </a:r>
           </a:p>
           <a:p>
@@ -10025,7 +10009,7 @@
           <p:cNvPr id="22" name="Tekstvak 24">
             <a:extLst>
               <a:ext uri="{FF2B5EF4-FFF2-40B4-BE49-F238E27FC236}">
-                <a16:creationId xmlns:a16="http://schemas.microsoft.com/office/drawing/2014/main" xmlns="" id="{6073C9BE-C429-4631-814F-5D377B0CD5A9}"/>
+                <a16:creationId xmlns="" xmlns:a16="http://schemas.microsoft.com/office/drawing/2014/main" id="{6073C9BE-C429-4631-814F-5D377B0CD5A9}"/>
               </a:ext>
             </a:extLst>
           </p:cNvPr>
@@ -10067,7 +10051,7 @@
           <p:cNvPr id="23" name="Tekstvak 24">
             <a:extLst>
               <a:ext uri="{FF2B5EF4-FFF2-40B4-BE49-F238E27FC236}">
-                <a16:creationId xmlns:a16="http://schemas.microsoft.com/office/drawing/2014/main" xmlns="" id="{5D5016BD-E991-4EFB-BBBA-396AA1A008B1}"/>
+                <a16:creationId xmlns="" xmlns:a16="http://schemas.microsoft.com/office/drawing/2014/main" id="{5D5016BD-E991-4EFB-BBBA-396AA1A008B1}"/>
               </a:ext>
             </a:extLst>
           </p:cNvPr>
@@ -10109,7 +10093,7 @@
           <p:cNvPr id="24" name="Tekstvak 24">
             <a:extLst>
               <a:ext uri="{FF2B5EF4-FFF2-40B4-BE49-F238E27FC236}">
-                <a16:creationId xmlns:a16="http://schemas.microsoft.com/office/drawing/2014/main" xmlns="" id="{6073C9BE-C429-4631-814F-5D377B0CD5A9}"/>
+                <a16:creationId xmlns="" xmlns:a16="http://schemas.microsoft.com/office/drawing/2014/main" id="{6073C9BE-C429-4631-814F-5D377B0CD5A9}"/>
               </a:ext>
             </a:extLst>
           </p:cNvPr>
@@ -10151,7 +10135,7 @@
           <p:cNvPr id="25" name="Tekstvak 24">
             <a:extLst>
               <a:ext uri="{FF2B5EF4-FFF2-40B4-BE49-F238E27FC236}">
-                <a16:creationId xmlns:a16="http://schemas.microsoft.com/office/drawing/2014/main" xmlns="" id="{6073C9BE-C429-4631-814F-5D377B0CD5A9}"/>
+                <a16:creationId xmlns="" xmlns:a16="http://schemas.microsoft.com/office/drawing/2014/main" id="{6073C9BE-C429-4631-814F-5D377B0CD5A9}"/>
               </a:ext>
             </a:extLst>
           </p:cNvPr>
@@ -10193,7 +10177,7 @@
           <p:cNvPr id="26" name="Tekstvak 24">
             <a:extLst>
               <a:ext uri="{FF2B5EF4-FFF2-40B4-BE49-F238E27FC236}">
-                <a16:creationId xmlns:a16="http://schemas.microsoft.com/office/drawing/2014/main" xmlns="" id="{6073C9BE-C429-4631-814F-5D377B0CD5A9}"/>
+                <a16:creationId xmlns="" xmlns:a16="http://schemas.microsoft.com/office/drawing/2014/main" id="{6073C9BE-C429-4631-814F-5D377B0CD5A9}"/>
               </a:ext>
             </a:extLst>
           </p:cNvPr>
@@ -10235,7 +10219,7 @@
           <p:cNvPr id="27" name="Tekstvak 24">
             <a:extLst>
               <a:ext uri="{FF2B5EF4-FFF2-40B4-BE49-F238E27FC236}">
-                <a16:creationId xmlns:a16="http://schemas.microsoft.com/office/drawing/2014/main" xmlns="" id="{5D5016BD-E991-4EFB-BBBA-396AA1A008B1}"/>
+                <a16:creationId xmlns="" xmlns:a16="http://schemas.microsoft.com/office/drawing/2014/main" id="{5D5016BD-E991-4EFB-BBBA-396AA1A008B1}"/>
               </a:ext>
             </a:extLst>
           </p:cNvPr>
@@ -10277,7 +10261,7 @@
           <p:cNvPr id="28" name="Tekstvak 24">
             <a:extLst>
               <a:ext uri="{FF2B5EF4-FFF2-40B4-BE49-F238E27FC236}">
-                <a16:creationId xmlns:a16="http://schemas.microsoft.com/office/drawing/2014/main" xmlns="" id="{6073C9BE-C429-4631-814F-5D377B0CD5A9}"/>
+                <a16:creationId xmlns="" xmlns:a16="http://schemas.microsoft.com/office/drawing/2014/main" id="{6073C9BE-C429-4631-814F-5D377B0CD5A9}"/>
               </a:ext>
             </a:extLst>
           </p:cNvPr>
@@ -10319,7 +10303,7 @@
           <p:cNvPr id="29" name="Tekstvak 28">
             <a:extLst>
               <a:ext uri="{FF2B5EF4-FFF2-40B4-BE49-F238E27FC236}">
-                <a16:creationId xmlns:a16="http://schemas.microsoft.com/office/drawing/2014/main" xmlns="" id="{6073C9BE-C429-4631-814F-5D377B0CD5A9}"/>
+                <a16:creationId xmlns="" xmlns:a16="http://schemas.microsoft.com/office/drawing/2014/main" id="{6073C9BE-C429-4631-814F-5D377B0CD5A9}"/>
               </a:ext>
             </a:extLst>
           </p:cNvPr>
@@ -10936,11 +10920,7 @@
           <a:p>
             <a:r>
               <a:rPr lang="nl-NL" sz="3600" dirty="0" smtClean="0"/>
-              <a:t>Onthouden </a:t>
-            </a:r>
-            <a:r>
-              <a:rPr lang="nl-NL" sz="3600" dirty="0" smtClean="0"/>
-              <a:t>na de </a:t>
+              <a:t>Onthouden na de </a:t>
             </a:r>
             <a:r>
               <a:rPr lang="nl-NL" sz="3600" dirty="0" err="1" smtClean="0"/>
@@ -10948,11 +10928,7 @@
             </a:r>
             <a:r>
               <a:rPr lang="nl-NL" sz="3600" dirty="0" smtClean="0"/>
-              <a:t> </a:t>
-            </a:r>
-            <a:r>
-              <a:rPr lang="nl-NL" sz="3600" dirty="0" smtClean="0"/>
-              <a:t>workshop</a:t>
+              <a:t> workshop</a:t>
             </a:r>
             <a:endParaRPr lang="nl-NL" sz="3600" dirty="0"/>
           </a:p>
@@ -11011,13 +10987,8 @@
             <a:pPr lvl="1"/>
             <a:r>
               <a:rPr lang="nl-NL" dirty="0" smtClean="0"/>
-              <a:t>Analoog </a:t>
-            </a:r>
-            <a:r>
-              <a:rPr lang="nl-NL" dirty="0" smtClean="0"/>
-              <a:t>In</a:t>
-            </a:r>
-            <a:endParaRPr lang="nl-NL" dirty="0" smtClean="0"/>
+              <a:t>Analoog In</a:t>
+            </a:r>
           </a:p>
           <a:p>
             <a:pPr lvl="1"/>
@@ -11054,13 +11025,8 @@
             </a:r>
             <a:r>
               <a:rPr lang="nl-NL" dirty="0" smtClean="0"/>
-              <a:t>, PWM) als alternatief voor het ontbreken van Analoog </a:t>
-            </a:r>
-            <a:r>
-              <a:rPr lang="nl-NL" dirty="0" smtClean="0"/>
-              <a:t>Uit</a:t>
-            </a:r>
-            <a:endParaRPr lang="nl-NL" dirty="0" smtClean="0"/>
+              <a:t>, PWM) als alternatief voor het ontbreken van Analoog Uit</a:t>
+            </a:r>
           </a:p>
           <a:p>
             <a:pPr lvl="2"/>
@@ -11292,7 +11258,15 @@
             </a:r>
             <a:r>
               <a:rPr lang="nl-NL" dirty="0" smtClean="0"/>
-              <a:t> lopen. Die staat op het bureaublad. Eenmalig na opstart van de </a:t>
+              <a:t> lopen. Die staat op het bureaublad. Eenmalig </a:t>
+            </a:r>
+            <a:r>
+              <a:rPr lang="nl-NL" dirty="0" smtClean="0"/>
+              <a:t>na eerste </a:t>
+            </a:r>
+            <a:r>
+              <a:rPr lang="nl-NL" dirty="0" smtClean="0"/>
+              <a:t>opstart van de </a:t>
             </a:r>
             <a:r>
               <a:rPr lang="nl-NL" dirty="0" err="1" smtClean="0"/>
@@ -11300,8 +11274,17 @@
             </a:r>
             <a:r>
               <a:rPr lang="nl-NL" dirty="0" smtClean="0"/>
+              <a:t>. Laat het dan installeren in </a:t>
+            </a:r>
+            <a:r>
+              <a:rPr lang="nl-NL" dirty="0" err="1" smtClean="0"/>
+              <a:t>crontab</a:t>
+            </a:r>
+            <a:r>
+              <a:rPr lang="nl-NL" dirty="0" smtClean="0"/>
               <a:t>.</a:t>
             </a:r>
+            <a:endParaRPr lang="nl-NL" dirty="0" smtClean="0"/>
           </a:p>
           <a:p>
             <a:pPr lvl="1"/>
@@ -13341,7 +13324,7 @@
           <p:cNvPr id="18" name="Tekstvak 24">
             <a:extLst>
               <a:ext uri="{FF2B5EF4-FFF2-40B4-BE49-F238E27FC236}">
-                <a16:creationId xmlns:a16="http://schemas.microsoft.com/office/drawing/2014/main" xmlns="" id="{6073C9BE-C429-4631-814F-5D377B0CD5A9}"/>
+                <a16:creationId xmlns="" xmlns:a16="http://schemas.microsoft.com/office/drawing/2014/main" id="{6073C9BE-C429-4631-814F-5D377B0CD5A9}"/>
               </a:ext>
             </a:extLst>
           </p:cNvPr>
@@ -13383,7 +13366,7 @@
           <p:cNvPr id="19" name="Tekstvak 24">
             <a:extLst>
               <a:ext uri="{FF2B5EF4-FFF2-40B4-BE49-F238E27FC236}">
-                <a16:creationId xmlns:a16="http://schemas.microsoft.com/office/drawing/2014/main" xmlns="" id="{5D5016BD-E991-4EFB-BBBA-396AA1A008B1}"/>
+                <a16:creationId xmlns="" xmlns:a16="http://schemas.microsoft.com/office/drawing/2014/main" id="{5D5016BD-E991-4EFB-BBBA-396AA1A008B1}"/>
               </a:ext>
             </a:extLst>
           </p:cNvPr>
@@ -13425,7 +13408,7 @@
           <p:cNvPr id="20" name="Tekstvak 24">
             <a:extLst>
               <a:ext uri="{FF2B5EF4-FFF2-40B4-BE49-F238E27FC236}">
-                <a16:creationId xmlns:a16="http://schemas.microsoft.com/office/drawing/2014/main" xmlns="" id="{6073C9BE-C429-4631-814F-5D377B0CD5A9}"/>
+                <a16:creationId xmlns="" xmlns:a16="http://schemas.microsoft.com/office/drawing/2014/main" id="{6073C9BE-C429-4631-814F-5D377B0CD5A9}"/>
               </a:ext>
             </a:extLst>
           </p:cNvPr>
@@ -13467,7 +13450,7 @@
           <p:cNvPr id="21" name="Tekstvak 24">
             <a:extLst>
               <a:ext uri="{FF2B5EF4-FFF2-40B4-BE49-F238E27FC236}">
-                <a16:creationId xmlns:a16="http://schemas.microsoft.com/office/drawing/2014/main" xmlns="" id="{6073C9BE-C429-4631-814F-5D377B0CD5A9}"/>
+                <a16:creationId xmlns="" xmlns:a16="http://schemas.microsoft.com/office/drawing/2014/main" id="{6073C9BE-C429-4631-814F-5D377B0CD5A9}"/>
               </a:ext>
             </a:extLst>
           </p:cNvPr>
@@ -13509,7 +13492,7 @@
           <p:cNvPr id="22" name="Tekstvak 24">
             <a:extLst>
               <a:ext uri="{FF2B5EF4-FFF2-40B4-BE49-F238E27FC236}">
-                <a16:creationId xmlns:a16="http://schemas.microsoft.com/office/drawing/2014/main" xmlns="" id="{6073C9BE-C429-4631-814F-5D377B0CD5A9}"/>
+                <a16:creationId xmlns="" xmlns:a16="http://schemas.microsoft.com/office/drawing/2014/main" id="{6073C9BE-C429-4631-814F-5D377B0CD5A9}"/>
               </a:ext>
             </a:extLst>
           </p:cNvPr>
@@ -13551,7 +13534,7 @@
           <p:cNvPr id="23" name="Tekstvak 24">
             <a:extLst>
               <a:ext uri="{FF2B5EF4-FFF2-40B4-BE49-F238E27FC236}">
-                <a16:creationId xmlns:a16="http://schemas.microsoft.com/office/drawing/2014/main" xmlns="" id="{5D5016BD-E991-4EFB-BBBA-396AA1A008B1}"/>
+                <a16:creationId xmlns="" xmlns:a16="http://schemas.microsoft.com/office/drawing/2014/main" id="{5D5016BD-E991-4EFB-BBBA-396AA1A008B1}"/>
               </a:ext>
             </a:extLst>
           </p:cNvPr>
@@ -13593,7 +13576,7 @@
           <p:cNvPr id="24" name="Tekstvak 24">
             <a:extLst>
               <a:ext uri="{FF2B5EF4-FFF2-40B4-BE49-F238E27FC236}">
-                <a16:creationId xmlns:a16="http://schemas.microsoft.com/office/drawing/2014/main" xmlns="" id="{6073C9BE-C429-4631-814F-5D377B0CD5A9}"/>
+                <a16:creationId xmlns="" xmlns:a16="http://schemas.microsoft.com/office/drawing/2014/main" id="{6073C9BE-C429-4631-814F-5D377B0CD5A9}"/>
               </a:ext>
             </a:extLst>
           </p:cNvPr>
@@ -13635,7 +13618,7 @@
           <p:cNvPr id="25" name="Tekstvak 24">
             <a:extLst>
               <a:ext uri="{FF2B5EF4-FFF2-40B4-BE49-F238E27FC236}">
-                <a16:creationId xmlns:a16="http://schemas.microsoft.com/office/drawing/2014/main" xmlns="" id="{6073C9BE-C429-4631-814F-5D377B0CD5A9}"/>
+                <a16:creationId xmlns="" xmlns:a16="http://schemas.microsoft.com/office/drawing/2014/main" id="{6073C9BE-C429-4631-814F-5D377B0CD5A9}"/>
               </a:ext>
             </a:extLst>
           </p:cNvPr>
@@ -14058,11 +14041,7 @@
             </a:r>
             <a:r>
               <a:rPr lang="nl-NL" dirty="0" smtClean="0"/>
-              <a:t> door </a:t>
-            </a:r>
-            <a:r>
-              <a:rPr lang="nl-NL" dirty="0" smtClean="0"/>
-              <a:t>dubbelklikken</a:t>
+              <a:t> door dubbelklikken</a:t>
             </a:r>
             <a:br>
               <a:rPr lang="nl-NL" dirty="0" smtClean="0"/>
@@ -14256,43 +14235,7 @@
             <a:pPr algn="ctr"/>
             <a:r>
               <a:rPr lang="nl-NL" smtClean="0"/>
-              <a:t>Deel</a:t>
-            </a:r>
-            <a:r>
-              <a:rPr lang="nl-NL" smtClean="0"/>
-              <a:t> </a:t>
-            </a:r>
-            <a:r>
-              <a:rPr lang="nl-NL" smtClean="0"/>
-              <a:t>2</a:t>
-            </a:r>
-            <a:r>
-              <a:rPr lang="nl-NL" smtClean="0"/>
-              <a:t>: Pulsbreedte Modulatie </a:t>
-            </a:r>
-            <a:r>
-              <a:rPr lang="nl-NL" smtClean="0"/>
-              <a:t>(</a:t>
-            </a:r>
-            <a:r>
-              <a:rPr lang="nl-NL" smtClean="0"/>
-              <a:t>Pulse Width </a:t>
-            </a:r>
-            <a:r>
-              <a:rPr lang="nl-NL" smtClean="0"/>
-              <a:t>Modulation</a:t>
-            </a:r>
-            <a:r>
-              <a:rPr lang="nl-NL" smtClean="0"/>
-              <a:t>, </a:t>
-            </a:r>
-            <a:r>
-              <a:rPr lang="nl-NL" smtClean="0"/>
-              <a:t>PWM</a:t>
-            </a:r>
-            <a:r>
-              <a:rPr lang="nl-NL" smtClean="0"/>
-              <a:t>)</a:t>
+              <a:t>Deel 2: Pulsbreedte Modulatie (Pulse Width Modulation, PWM)</a:t>
             </a:r>
             <a:endParaRPr lang="nl-NL"/>
           </a:p>
@@ -14467,11 +14410,7 @@
             <a:pPr lvl="1"/>
             <a:r>
               <a:rPr lang="nl-NL" dirty="0" smtClean="0"/>
-              <a:t>Echter, er </a:t>
-            </a:r>
-            <a:r>
-              <a:rPr lang="nl-NL" dirty="0" smtClean="0"/>
-              <a:t>is een goed alternatief: pulsbreedte modulatie (</a:t>
+              <a:t>Echter, er is een goed alternatief: pulsbreedte modulatie (</a:t>
             </a:r>
             <a:r>
               <a:rPr lang="nl-NL" dirty="0" err="1" smtClean="0"/>

</xml_diff>